<commit_message>
- Fixed the documents
</commit_message>
<xml_diff>
--- a/Documentation/VoIP UserAgent - Presentation.pptx
+++ b/Documentation/VoIP UserAgent - Presentation.pptx
@@ -760,8 +760,8 @@
         </p:nvSpPr>
         <p:spPr>
           <a:xfrm>
-            <a:off x="381300" y="685800"/>
-            <a:ext cx="6096075" cy="3429000"/>
+            <a:off x="381000" y="685800"/>
+            <a:ext cx="6096000" cy="3429000"/>
           </a:xfrm>
           <a:custGeom>
             <a:avLst/>
@@ -9062,10 +9062,10 @@
               <a:buNone/>
             </a:pPr>
             <a:r>
-              <a:rPr lang="it"/>
+              <a:rPr lang="it" dirty="0"/>
               <a:t>SIP UserAgent written in Java</a:t>
             </a:r>
-            <a:endParaRPr/>
+            <a:endParaRPr dirty="0"/>
           </a:p>
           <a:p>
             <a:pPr marL="0" lvl="0" indent="0" algn="ctr" rtl="0">
@@ -9077,7 +9077,7 @@
               </a:spcAft>
               <a:buNone/>
             </a:pPr>
-            <a:endParaRPr sz="1400"/>
+            <a:endParaRPr sz="1400" dirty="0"/>
           </a:p>
           <a:p>
             <a:pPr marL="0" lvl="0" indent="0" algn="just" rtl="0">
@@ -9090,7 +9090,7 @@
               <a:buNone/>
             </a:pPr>
             <a:r>
-              <a:rPr lang="it" sz="1400"/>
+              <a:rPr lang="it" sz="1400" dirty="0"/>
               <a:t>Maven Project - JavaFX Application</a:t>
             </a:r>
             <a:endParaRPr sz="1400"/>
@@ -9162,20 +9162,13 @@
           </a:bodyPr>
           <a:lstStyle/>
           <a:p>
-            <a:pPr marL="0" lvl="0" indent="0" algn="just" rtl="0">
+            <a:pPr lvl="0" algn="just">
               <a:lnSpc>
                 <a:spcPct val="150000"/>
               </a:lnSpc>
-              <a:spcBef>
-                <a:spcPts val="0"/>
-              </a:spcBef>
-              <a:spcAft>
-                <a:spcPts val="0"/>
-              </a:spcAft>
-              <a:buNone/>
             </a:pPr>
             <a:r>
-              <a:rPr lang="it">
+              <a:rPr lang="en-US" dirty="0">
                 <a:solidFill>
                   <a:schemeClr val="lt1"/>
                 </a:solidFill>
@@ -9184,9 +9177,9 @@
                 <a:cs typeface="Roboto"/>
                 <a:sym typeface="Roboto"/>
               </a:rPr>
-              <a:t>https://github.com/danielepelleg/VoIP</a:t>
+              <a:t>https://github.com/silversoft77/VoIP-UserAgent</a:t>
             </a:r>
-            <a:endParaRPr>
+            <a:endParaRPr dirty="0">
               <a:solidFill>
                 <a:schemeClr val="lt1"/>
               </a:solidFill>

</xml_diff>